<commit_message>
changed images in review day 1 powerpoint
</commit_message>
<xml_diff>
--- a/2018/python/day1-review.pptx
+++ b/2018/python/day1-review.pptx
@@ -830,6 +830,90 @@
 </file>
 
 <file path=ppt/notesSlides/notesSlide4.xml><?xml version="1.0" encoding="utf-8"?>
+<p:notes xmlns:a="http://schemas.openxmlformats.org/drawingml/2006/main" xmlns:r="http://schemas.openxmlformats.org/officeDocument/2006/relationships" xmlns:p="http://schemas.openxmlformats.org/presentationml/2006/main">
+  <p:cSld>
+    <p:spTree>
+      <p:nvGrpSpPr>
+        <p:cNvPr id="1" name=""/>
+        <p:cNvGrpSpPr/>
+        <p:nvPr/>
+      </p:nvGrpSpPr>
+      <p:grpSpPr>
+        <a:xfrm>
+          <a:off x="0" y="0"/>
+          <a:ext cx="0" cy="0"/>
+          <a:chOff x="0" y="0"/>
+          <a:chExt cx="0" cy="0"/>
+        </a:xfrm>
+      </p:grpSpPr>
+      <p:sp>
+        <p:nvSpPr>
+          <p:cNvPr id="2" name="Slide Image Placeholder 1"/>
+          <p:cNvSpPr>
+            <a:spLocks noGrp="1" noRot="1" noChangeAspect="1"/>
+          </p:cNvSpPr>
+          <p:nvPr>
+            <p:ph type="sldImg"/>
+          </p:nvPr>
+        </p:nvSpPr>
+        <p:spPr/>
+      </p:sp>
+      <p:sp>
+        <p:nvSpPr>
+          <p:cNvPr id="3" name="Notes Placeholder 2"/>
+          <p:cNvSpPr>
+            <a:spLocks noGrp="1"/>
+          </p:cNvSpPr>
+          <p:nvPr>
+            <p:ph type="body" idx="1"/>
+          </p:nvPr>
+        </p:nvSpPr>
+        <p:spPr/>
+        <p:txBody>
+          <a:bodyPr/>
+          <a:lstStyle/>
+          <a:p>
+            <a:endParaRPr lang="en-US" dirty="0"/>
+          </a:p>
+        </p:txBody>
+      </p:sp>
+      <p:sp>
+        <p:nvSpPr>
+          <p:cNvPr id="4" name="Slide Number Placeholder 3"/>
+          <p:cNvSpPr>
+            <a:spLocks noGrp="1"/>
+          </p:cNvSpPr>
+          <p:nvPr>
+            <p:ph type="sldNum" sz="quarter" idx="10"/>
+          </p:nvPr>
+        </p:nvSpPr>
+        <p:spPr/>
+        <p:txBody>
+          <a:bodyPr/>
+          <a:lstStyle/>
+          <a:p>
+            <a:fld id="{A9CC174F-F1AE-864A-B0AB-92F26DAE64FF}" type="slidenum">
+              <a:rPr lang="en-US" smtClean="0"/>
+              <a:t>4</a:t>
+            </a:fld>
+            <a:endParaRPr lang="en-US"/>
+          </a:p>
+        </p:txBody>
+      </p:sp>
+    </p:spTree>
+    <p:extLst>
+      <p:ext uri="{BB962C8B-B14F-4D97-AF65-F5344CB8AC3E}">
+        <p14:creationId xmlns:p14="http://schemas.microsoft.com/office/powerpoint/2010/main" val="324641378"/>
+      </p:ext>
+    </p:extLst>
+  </p:cSld>
+  <p:clrMapOvr>
+    <a:masterClrMapping/>
+  </p:clrMapOvr>
+</p:notes>
+</file>
+
+<file path=ppt/notesSlides/notesSlide5.xml><?xml version="1.0" encoding="utf-8"?>
 <p:notes xmlns:a="http://schemas.openxmlformats.org/drawingml/2006/main" xmlns:r="http://schemas.openxmlformats.org/officeDocument/2006/relationships" xmlns:p="http://schemas.openxmlformats.org/presentationml/2006/main" showMasterSp="0" showMasterPhAnim="0">
   <p:cSld>
     <p:spTree>
@@ -945,7 +1029,7 @@
 </p:notes>
 </file>
 
-<file path=ppt/notesSlides/notesSlide5.xml><?xml version="1.0" encoding="utf-8"?>
+<file path=ppt/notesSlides/notesSlide6.xml><?xml version="1.0" encoding="utf-8"?>
 <p:notes xmlns:a="http://schemas.openxmlformats.org/drawingml/2006/main" xmlns:r="http://schemas.openxmlformats.org/officeDocument/2006/relationships" xmlns:p="http://schemas.openxmlformats.org/presentationml/2006/main" showMasterSp="0" showMasterPhAnim="0">
   <p:cSld>
     <p:spTree>
@@ -1044,7 +1128,7 @@
               </a:spcBef>
               <a:buNone/>
             </a:pPr>
-            <a:endParaRPr/>
+            <a:endParaRPr dirty="0"/>
           </a:p>
         </p:txBody>
       </p:sp>
@@ -4439,11 +4523,7 @@
             </a:pPr>
             <a:r>
               <a:rPr lang="en-US" smtClean="0"/>
-              <a:t>HILT </a:t>
-            </a:r>
-            <a:r>
-              <a:rPr lang="en-US" smtClean="0"/>
-              <a:t>2018</a:t>
+              <a:t>HILT 2018</a:t>
             </a:r>
             <a:endParaRPr lang="en" dirty="0"/>
           </a:p>
@@ -5036,22 +5116,28 @@
       </p:sp>
       <p:pic>
         <p:nvPicPr>
-          <p:cNvPr id="4" name="Picture 3"/>
+          <p:cNvPr id="5" name="Picture 4"/>
           <p:cNvPicPr>
             <a:picLocks noChangeAspect="1"/>
           </p:cNvPicPr>
           <p:nvPr/>
         </p:nvPicPr>
         <p:blipFill>
-          <a:blip r:embed="rId2"/>
+          <a:blip r:embed="rId3">
+            <a:extLst>
+              <a:ext uri="{28A0092B-C50C-407E-A947-70E740481C1C}">
+                <a14:useLocalDpi xmlns:a14="http://schemas.microsoft.com/office/drawing/2010/main" val="0"/>
+              </a:ext>
+            </a:extLst>
+          </a:blip>
           <a:stretch>
             <a:fillRect/>
           </a:stretch>
         </p:blipFill>
         <p:spPr>
           <a:xfrm>
-            <a:off x="1854200" y="0"/>
-            <a:ext cx="5429250" cy="6858000"/>
+            <a:off x="902441" y="1417637"/>
+            <a:ext cx="7339118" cy="4250817"/>
           </a:xfrm>
           <a:prstGeom prst="rect">
             <a:avLst/>
@@ -5201,22 +5287,28 @@
       </p:sp>
       <p:pic>
         <p:nvPicPr>
-          <p:cNvPr id="2" name="Picture 1"/>
+          <p:cNvPr id="3" name="Picture 2"/>
           <p:cNvPicPr>
             <a:picLocks noChangeAspect="1"/>
           </p:cNvPicPr>
           <p:nvPr/>
         </p:nvPicPr>
         <p:blipFill>
-          <a:blip r:embed="rId3"/>
+          <a:blip r:embed="rId3">
+            <a:extLst>
+              <a:ext uri="{28A0092B-C50C-407E-A947-70E740481C1C}">
+                <a14:useLocalDpi xmlns:a14="http://schemas.microsoft.com/office/drawing/2010/main" val="0"/>
+              </a:ext>
+            </a:extLst>
+          </a:blip>
           <a:stretch>
             <a:fillRect/>
           </a:stretch>
         </p:blipFill>
         <p:spPr>
           <a:xfrm>
-            <a:off x="2984500" y="2489761"/>
-            <a:ext cx="3175000" cy="3175000"/>
+            <a:off x="1323975" y="1600200"/>
+            <a:ext cx="6496050" cy="4872038"/>
           </a:xfrm>
           <a:prstGeom prst="rect">
             <a:avLst/>

</xml_diff>